<commit_message>
chore: Update URLs for getting data points and expected curve
</commit_message>
<xml_diff>
--- a/CoDEEC/Apresentação_Francisco_Antunes/CoDEEC_aprsentação_Francisco_Antunes.pptx
+++ b/CoDEEC/Apresentação_Francisco_Antunes/CoDEEC_aprsentação_Francisco_Antunes.pptx
@@ -114,16 +114,32 @@
 </p:presentation>
 </file>
 
-<file path=ppt/revisionInfo.xml><?xml version="1.0" encoding="utf-8"?>
-<p1510:revInfo xmlns:a="http://schemas.openxmlformats.org/drawingml/2006/main" xmlns:r="http://schemas.openxmlformats.org/officeDocument/2006/relationships" xmlns:p1510="http://schemas.microsoft.com/office/powerpoint/2015/10/main">
-  <p1510:revLst>
-    <p1510:client id="{0D9E37E2-93F9-49CE-8301-B4C12CFDF25A}" v="188" dt="2024-01-29T12:35:20.410"/>
-  </p1510:revLst>
-</p1510:revInfo>
-</file>
-
 <file path=ppt/changesInfos/changesInfo1.xml><?xml version="1.0" encoding="utf-8"?>
 <pc:chgInfo xmlns:a="http://schemas.openxmlformats.org/drawingml/2006/main" xmlns:r="http://schemas.openxmlformats.org/officeDocument/2006/relationships" xmlns:ac="http://schemas.microsoft.com/office/drawing/2013/main/command" xmlns:pc="http://schemas.microsoft.com/office/powerpoint/2013/main/command">
+  <pc:docChgLst>
+    <pc:chgData name="Francisco Antunes" userId="e2af027ea0584e08" providerId="LiveId" clId="{1AD64937-7C3C-41B6-8AFF-03D8C25CE0EC}"/>
+    <pc:docChg chg="custSel modSld">
+      <pc:chgData name="Francisco Antunes" userId="e2af027ea0584e08" providerId="LiveId" clId="{1AD64937-7C3C-41B6-8AFF-03D8C25CE0EC}" dt="2024-06-30T21:52:00.618" v="1" actId="27636"/>
+      <pc:docMkLst>
+        <pc:docMk/>
+      </pc:docMkLst>
+      <pc:sldChg chg="modSp mod">
+        <pc:chgData name="Francisco Antunes" userId="e2af027ea0584e08" providerId="LiveId" clId="{1AD64937-7C3C-41B6-8AFF-03D8C25CE0EC}" dt="2024-06-30T21:52:00.618" v="1" actId="27636"/>
+        <pc:sldMkLst>
+          <pc:docMk/>
+          <pc:sldMk cId="3979222925" sldId="256"/>
+        </pc:sldMkLst>
+        <pc:spChg chg="mod">
+          <ac:chgData name="Francisco Antunes" userId="e2af027ea0584e08" providerId="LiveId" clId="{1AD64937-7C3C-41B6-8AFF-03D8C25CE0EC}" dt="2024-06-30T21:52:00.618" v="1" actId="27636"/>
+          <ac:spMkLst>
+            <pc:docMk/>
+            <pc:sldMk cId="3979222925" sldId="256"/>
+            <ac:spMk id="2" creationId="{75EE0D3E-68F8-691B-4062-379F33FA87A7}"/>
+          </ac:spMkLst>
+        </pc:spChg>
+      </pc:sldChg>
+    </pc:docChg>
+  </pc:docChgLst>
   <pc:docChgLst>
     <pc:chgData name="Francisco Antunes" userId="e2af027ea0584e08" providerId="LiveId" clId="{0D9E37E2-93F9-49CE-8301-B4C12CFDF25A}"/>
     <pc:docChg chg="undo custSel addSld delSld modSld">
@@ -4631,7 +4647,7 @@
           <a:p>
             <a:fld id="{EFA0D54C-432E-4B00-9A9E-9D067A897FEE}" type="datetimeFigureOut">
               <a:rPr lang="pt-PT" smtClean="0"/>
-              <a:t>29/01/2024</a:t>
+              <a:t>30/06/2024</a:t>
             </a:fld>
             <a:endParaRPr lang="pt-PT"/>
           </a:p>
@@ -4831,7 +4847,7 @@
           <a:p>
             <a:fld id="{EFA0D54C-432E-4B00-9A9E-9D067A897FEE}" type="datetimeFigureOut">
               <a:rPr lang="pt-PT" smtClean="0"/>
-              <a:t>29/01/2024</a:t>
+              <a:t>30/06/2024</a:t>
             </a:fld>
             <a:endParaRPr lang="pt-PT"/>
           </a:p>
@@ -5041,7 +5057,7 @@
           <a:p>
             <a:fld id="{EFA0D54C-432E-4B00-9A9E-9D067A897FEE}" type="datetimeFigureOut">
               <a:rPr lang="pt-PT" smtClean="0"/>
-              <a:t>29/01/2024</a:t>
+              <a:t>30/06/2024</a:t>
             </a:fld>
             <a:endParaRPr lang="pt-PT"/>
           </a:p>
@@ -5241,7 +5257,7 @@
           <a:p>
             <a:fld id="{EFA0D54C-432E-4B00-9A9E-9D067A897FEE}" type="datetimeFigureOut">
               <a:rPr lang="pt-PT" smtClean="0"/>
-              <a:t>29/01/2024</a:t>
+              <a:t>30/06/2024</a:t>
             </a:fld>
             <a:endParaRPr lang="pt-PT"/>
           </a:p>
@@ -5517,7 +5533,7 @@
           <a:p>
             <a:fld id="{EFA0D54C-432E-4B00-9A9E-9D067A897FEE}" type="datetimeFigureOut">
               <a:rPr lang="pt-PT" smtClean="0"/>
-              <a:t>29/01/2024</a:t>
+              <a:t>30/06/2024</a:t>
             </a:fld>
             <a:endParaRPr lang="pt-PT"/>
           </a:p>
@@ -5785,7 +5801,7 @@
           <a:p>
             <a:fld id="{EFA0D54C-432E-4B00-9A9E-9D067A897FEE}" type="datetimeFigureOut">
               <a:rPr lang="pt-PT" smtClean="0"/>
-              <a:t>29/01/2024</a:t>
+              <a:t>30/06/2024</a:t>
             </a:fld>
             <a:endParaRPr lang="pt-PT"/>
           </a:p>
@@ -6200,7 +6216,7 @@
           <a:p>
             <a:fld id="{EFA0D54C-432E-4B00-9A9E-9D067A897FEE}" type="datetimeFigureOut">
               <a:rPr lang="pt-PT" smtClean="0"/>
-              <a:t>29/01/2024</a:t>
+              <a:t>30/06/2024</a:t>
             </a:fld>
             <a:endParaRPr lang="pt-PT"/>
           </a:p>
@@ -6342,7 +6358,7 @@
           <a:p>
             <a:fld id="{EFA0D54C-432E-4B00-9A9E-9D067A897FEE}" type="datetimeFigureOut">
               <a:rPr lang="pt-PT" smtClean="0"/>
-              <a:t>29/01/2024</a:t>
+              <a:t>30/06/2024</a:t>
             </a:fld>
             <a:endParaRPr lang="pt-PT"/>
           </a:p>
@@ -6455,7 +6471,7 @@
           <a:p>
             <a:fld id="{EFA0D54C-432E-4B00-9A9E-9D067A897FEE}" type="datetimeFigureOut">
               <a:rPr lang="pt-PT" smtClean="0"/>
-              <a:t>29/01/2024</a:t>
+              <a:t>30/06/2024</a:t>
             </a:fld>
             <a:endParaRPr lang="pt-PT"/>
           </a:p>
@@ -6768,7 +6784,7 @@
           <a:p>
             <a:fld id="{EFA0D54C-432E-4B00-9A9E-9D067A897FEE}" type="datetimeFigureOut">
               <a:rPr lang="pt-PT" smtClean="0"/>
-              <a:t>29/01/2024</a:t>
+              <a:t>30/06/2024</a:t>
             </a:fld>
             <a:endParaRPr lang="pt-PT"/>
           </a:p>
@@ -7057,7 +7073,7 @@
           <a:p>
             <a:fld id="{EFA0D54C-432E-4B00-9A9E-9D067A897FEE}" type="datetimeFigureOut">
               <a:rPr lang="pt-PT" smtClean="0"/>
-              <a:t>29/01/2024</a:t>
+              <a:t>30/06/2024</a:t>
             </a:fld>
             <a:endParaRPr lang="pt-PT"/>
           </a:p>
@@ -7300,7 +7316,7 @@
           <a:p>
             <a:fld id="{EFA0D54C-432E-4B00-9A9E-9D067A897FEE}" type="datetimeFigureOut">
               <a:rPr lang="pt-PT" smtClean="0"/>
-              <a:t>29/01/2024</a:t>
+              <a:t>30/06/2024</a:t>
             </a:fld>
             <a:endParaRPr lang="pt-PT"/>
           </a:p>
@@ -7735,12 +7751,50 @@
         </p:nvSpPr>
         <p:spPr/>
         <p:txBody>
-          <a:bodyPr/>
+          <a:bodyPr>
+            <a:normAutofit fontScale="90000"/>
+          </a:bodyPr>
           <a:lstStyle/>
           <a:p>
             <a:r>
-              <a:rPr lang="en-US" dirty="0"/>
-              <a:t>Human gait analysis using a wireless knee pad</a:t>
+              <a:rPr lang="en-US" sz="6000" b="0" i="0" kern="1200">
+                <a:solidFill>
+                  <a:schemeClr val="tx1"/>
+                </a:solidFill>
+                <a:effectLst/>
+                <a:highlight>
+                  <a:srgbClr val="FFFFFF"/>
+                </a:highlight>
+                <a:latin typeface="+mj-lt"/>
+                <a:ea typeface="+mj-ea"/>
+                <a:cs typeface="+mj-cs"/>
+              </a:rPr>
+              <a:t>Human Gait Analysis using an Instrumented</a:t>
+            </a:r>
+            <a:br>
+              <a:rPr lang="en-US" sz="6000" kern="1200">
+                <a:solidFill>
+                  <a:schemeClr val="tx1"/>
+                </a:solidFill>
+                <a:latin typeface="+mj-lt"/>
+                <a:ea typeface="+mj-ea"/>
+                <a:cs typeface="+mj-cs"/>
+              </a:rPr>
+            </a:br>
+            <a:r>
+              <a:rPr lang="en-US" sz="6000" b="0" i="0" kern="1200">
+                <a:solidFill>
+                  <a:schemeClr val="tx1"/>
+                </a:solidFill>
+                <a:effectLst/>
+                <a:highlight>
+                  <a:srgbClr val="FFFFFF"/>
+                </a:highlight>
+                <a:latin typeface="+mj-lt"/>
+                <a:ea typeface="+mj-ea"/>
+                <a:cs typeface="+mj-cs"/>
+              </a:rPr>
+              <a:t>Knee Brace</a:t>
             </a:r>
             <a:endParaRPr lang="pt-PT" dirty="0"/>
           </a:p>

</xml_diff>